<commit_message>
Slight changes to preso
</commit_message>
<xml_diff>
--- a/packages/server/notebooks/presentation.pptx
+++ b/packages/server/notebooks/presentation.pptx
@@ -5,7 +5,7 @@
     <p:sldMasterId id="2147483648" r:id="rId1"/>
   </p:sldMasterIdLst>
   <p:notesMasterIdLst>
-    <p:notesMasterId r:id="rId10"/>
+    <p:notesMasterId r:id="rId12"/>
   </p:notesMasterIdLst>
   <p:sldIdLst>
     <p:sldId id="271" r:id="rId2"/>
@@ -13,9 +13,11 @@
     <p:sldId id="273" r:id="rId4"/>
     <p:sldId id="274" r:id="rId5"/>
     <p:sldId id="275" r:id="rId6"/>
-    <p:sldId id="276" r:id="rId7"/>
-    <p:sldId id="277" r:id="rId8"/>
-    <p:sldId id="278" r:id="rId9"/>
+    <p:sldId id="279" r:id="rId7"/>
+    <p:sldId id="280" r:id="rId8"/>
+    <p:sldId id="276" r:id="rId9"/>
+    <p:sldId id="277" r:id="rId10"/>
+    <p:sldId id="278" r:id="rId11"/>
   </p:sldIdLst>
   <p:sldSz cx="12192000" cy="6858000"/>
   <p:notesSz cx="6858000" cy="9144000"/>
@@ -204,7 +206,7 @@
           <a:p>
             <a:fld id="{A5C20BB3-3CCB-4FE5-991B-82F6BCB48AF3}" type="datetimeFigureOut">
               <a:rPr lang="en-US" smtClean="0"/>
-              <a:t>10/4/2019</a:t>
+              <a:t>10/5/2019</a:t>
             </a:fld>
             <a:endParaRPr lang="en-US"/>
           </a:p>
@@ -618,7 +620,7 @@
           <a:p>
             <a:fld id="{5D6495F3-B757-4FAF-98AA-EDA7D1485485}" type="datetimeFigureOut">
               <a:rPr lang="en-US" smtClean="0"/>
-              <a:t>10/4/2019</a:t>
+              <a:t>10/5/2019</a:t>
             </a:fld>
             <a:endParaRPr lang="en-US"/>
           </a:p>
@@ -816,7 +818,7 @@
           <a:p>
             <a:fld id="{5D6495F3-B757-4FAF-98AA-EDA7D1485485}" type="datetimeFigureOut">
               <a:rPr lang="en-US" smtClean="0"/>
-              <a:t>10/4/2019</a:t>
+              <a:t>10/5/2019</a:t>
             </a:fld>
             <a:endParaRPr lang="en-US"/>
           </a:p>
@@ -1024,7 +1026,7 @@
           <a:p>
             <a:fld id="{5D6495F3-B757-4FAF-98AA-EDA7D1485485}" type="datetimeFigureOut">
               <a:rPr lang="en-US" smtClean="0"/>
-              <a:t>10/4/2019</a:t>
+              <a:t>10/5/2019</a:t>
             </a:fld>
             <a:endParaRPr lang="en-US"/>
           </a:p>
@@ -1222,7 +1224,7 @@
           <a:p>
             <a:fld id="{5D6495F3-B757-4FAF-98AA-EDA7D1485485}" type="datetimeFigureOut">
               <a:rPr lang="en-US" smtClean="0"/>
-              <a:t>10/4/2019</a:t>
+              <a:t>10/5/2019</a:t>
             </a:fld>
             <a:endParaRPr lang="en-US"/>
           </a:p>
@@ -1497,7 +1499,7 @@
           <a:p>
             <a:fld id="{5D6495F3-B757-4FAF-98AA-EDA7D1485485}" type="datetimeFigureOut">
               <a:rPr lang="en-US" smtClean="0"/>
-              <a:t>10/4/2019</a:t>
+              <a:t>10/5/2019</a:t>
             </a:fld>
             <a:endParaRPr lang="en-US"/>
           </a:p>
@@ -1762,7 +1764,7 @@
           <a:p>
             <a:fld id="{5D6495F3-B757-4FAF-98AA-EDA7D1485485}" type="datetimeFigureOut">
               <a:rPr lang="en-US" smtClean="0"/>
-              <a:t>10/4/2019</a:t>
+              <a:t>10/5/2019</a:t>
             </a:fld>
             <a:endParaRPr lang="en-US"/>
           </a:p>
@@ -2174,7 +2176,7 @@
           <a:p>
             <a:fld id="{5D6495F3-B757-4FAF-98AA-EDA7D1485485}" type="datetimeFigureOut">
               <a:rPr lang="en-US" smtClean="0"/>
-              <a:t>10/4/2019</a:t>
+              <a:t>10/5/2019</a:t>
             </a:fld>
             <a:endParaRPr lang="en-US"/>
           </a:p>
@@ -2315,7 +2317,7 @@
           <a:p>
             <a:fld id="{5D6495F3-B757-4FAF-98AA-EDA7D1485485}" type="datetimeFigureOut">
               <a:rPr lang="en-US" smtClean="0"/>
-              <a:t>10/4/2019</a:t>
+              <a:t>10/5/2019</a:t>
             </a:fld>
             <a:endParaRPr lang="en-US"/>
           </a:p>
@@ -2428,7 +2430,7 @@
           <a:p>
             <a:fld id="{5D6495F3-B757-4FAF-98AA-EDA7D1485485}" type="datetimeFigureOut">
               <a:rPr lang="en-US" smtClean="0"/>
-              <a:t>10/4/2019</a:t>
+              <a:t>10/5/2019</a:t>
             </a:fld>
             <a:endParaRPr lang="en-US"/>
           </a:p>
@@ -2739,7 +2741,7 @@
           <a:p>
             <a:fld id="{5D6495F3-B757-4FAF-98AA-EDA7D1485485}" type="datetimeFigureOut">
               <a:rPr lang="en-US" smtClean="0"/>
-              <a:t>10/4/2019</a:t>
+              <a:t>10/5/2019</a:t>
             </a:fld>
             <a:endParaRPr lang="en-US"/>
           </a:p>
@@ -3030,7 +3032,7 @@
           <a:p>
             <a:fld id="{5D6495F3-B757-4FAF-98AA-EDA7D1485485}" type="datetimeFigureOut">
               <a:rPr lang="en-US" smtClean="0"/>
-              <a:t>10/4/2019</a:t>
+              <a:t>10/5/2019</a:t>
             </a:fld>
             <a:endParaRPr lang="en-US"/>
           </a:p>
@@ -3271,7 +3273,7 @@
           <a:p>
             <a:fld id="{5D6495F3-B757-4FAF-98AA-EDA7D1485485}" type="datetimeFigureOut">
               <a:rPr lang="en-US" smtClean="0"/>
-              <a:t>10/4/2019</a:t>
+              <a:t>10/5/2019</a:t>
             </a:fld>
             <a:endParaRPr lang="en-US"/>
           </a:p>
@@ -4031,6 +4033,71 @@
     <p:extLst>
       <p:ext uri="{BB962C8B-B14F-4D97-AF65-F5344CB8AC3E}">
         <p14:creationId xmlns:p14="http://schemas.microsoft.com/office/powerpoint/2010/main" val="1022985811"/>
+      </p:ext>
+    </p:extLst>
+  </p:cSld>
+  <p:clrMapOvr>
+    <a:masterClrMapping/>
+  </p:clrMapOvr>
+</p:sld>
+</file>
+
+<file path=ppt/slides/slide10.xml><?xml version="1.0" encoding="utf-8"?>
+<p:sld xmlns:a="http://schemas.openxmlformats.org/drawingml/2006/main" xmlns:r="http://schemas.openxmlformats.org/officeDocument/2006/relationships" xmlns:p="http://schemas.openxmlformats.org/presentationml/2006/main">
+  <p:cSld>
+    <p:spTree>
+      <p:nvGrpSpPr>
+        <p:cNvPr id="1" name=""/>
+        <p:cNvGrpSpPr/>
+        <p:nvPr/>
+      </p:nvGrpSpPr>
+      <p:grpSpPr>
+        <a:xfrm>
+          <a:off x="0" y="0"/>
+          <a:ext cx="0" cy="0"/>
+          <a:chOff x="0" y="0"/>
+          <a:chExt cx="0" cy="0"/>
+        </a:xfrm>
+      </p:grpSpPr>
+      <p:sp>
+        <p:nvSpPr>
+          <p:cNvPr id="2" name="TextBox 1">
+            <a:extLst>
+              <a:ext uri="{FF2B5EF4-FFF2-40B4-BE49-F238E27FC236}">
+                <a16:creationId xmlns:a16="http://schemas.microsoft.com/office/drawing/2014/main" id="{7AEE4CEF-26E9-4BCC-9D7B-1088C239C2F1}"/>
+              </a:ext>
+            </a:extLst>
+          </p:cNvPr>
+          <p:cNvSpPr txBox="1"/>
+          <p:nvPr/>
+        </p:nvSpPr>
+        <p:spPr>
+          <a:xfrm rot="20295732">
+            <a:off x="4678258" y="3044279"/>
+            <a:ext cx="2835482" cy="769441"/>
+          </a:xfrm>
+          <a:prstGeom prst="rect">
+            <a:avLst/>
+          </a:prstGeom>
+          <a:noFill/>
+        </p:spPr>
+        <p:txBody>
+          <a:bodyPr wrap="square" rtlCol="0">
+            <a:spAutoFit/>
+          </a:bodyPr>
+          <a:lstStyle/>
+          <a:p>
+            <a:r>
+              <a:rPr lang="en-AU" sz="4400" dirty="0"/>
+              <a:t>SUMMARY</a:t>
+            </a:r>
+          </a:p>
+        </p:txBody>
+      </p:sp>
+    </p:spTree>
+    <p:extLst>
+      <p:ext uri="{BB962C8B-B14F-4D97-AF65-F5344CB8AC3E}">
+        <p14:creationId xmlns:p14="http://schemas.microsoft.com/office/powerpoint/2010/main" val="3777577520"/>
       </p:ext>
     </p:extLst>
   </p:cSld>
@@ -5719,7 +5786,7 @@
         </p:blipFill>
         <p:spPr>
           <a:xfrm>
-            <a:off x="203195" y="118702"/>
+            <a:off x="-121547" y="110150"/>
             <a:ext cx="7126522" cy="6637700"/>
           </a:xfrm>
           <a:prstGeom prst="rect">
@@ -5741,8 +5808,8 @@
         </p:nvSpPr>
         <p:spPr>
           <a:xfrm>
-            <a:off x="7765142" y="1188836"/>
-            <a:ext cx="3918857" cy="1938992"/>
+            <a:off x="7422482" y="1377658"/>
+            <a:ext cx="3918857" cy="5016758"/>
           </a:xfrm>
           <a:prstGeom prst="rect">
             <a:avLst/>
@@ -5767,6 +5834,16 @@
             </a:pPr>
             <a:r>
               <a:rPr lang="en-AU" sz="2000" dirty="0"/>
+              <a:t>Not Connected</a:t>
+            </a:r>
+          </a:p>
+          <a:p>
+            <a:pPr marL="342900" indent="-342900">
+              <a:buFont typeface="Arial" panose="020B0604020202020204" pitchFamily="34" charset="0"/>
+              <a:buChar char="•"/>
+            </a:pPr>
+            <a:r>
+              <a:rPr lang="en-AU" sz="2000" dirty="0"/>
               <a:t>Bipartite Network</a:t>
             </a:r>
           </a:p>
@@ -5798,66 +5875,51 @@
             <a:endParaRPr lang="en-AU" sz="2000" dirty="0"/>
           </a:p>
           <a:p>
+            <a:r>
+              <a:rPr lang="en-AU" sz="2000" dirty="0"/>
+              <a:t>Things to note:</a:t>
+            </a:r>
+          </a:p>
+          <a:p>
+            <a:pPr marL="285750" indent="-285750">
+              <a:buFont typeface="Arial" panose="020B0604020202020204" pitchFamily="34" charset="0"/>
+              <a:buChar char="•"/>
+            </a:pPr>
+            <a:r>
+              <a:rPr lang="en-AU" sz="2000" dirty="0"/>
+              <a:t>Red nodes act as bridge between two networks. These are people who contributed to more than one repo.</a:t>
+            </a:r>
+          </a:p>
+          <a:p>
+            <a:pPr marL="285750" indent="-285750">
+              <a:buFont typeface="Arial" panose="020B0604020202020204" pitchFamily="34" charset="0"/>
+              <a:buChar char="•"/>
+            </a:pPr>
+            <a:r>
+              <a:rPr lang="en-AU" sz="2000" dirty="0"/>
+              <a:t>Nodes with thick edges have higher contribution rate.</a:t>
+            </a:r>
+          </a:p>
+          <a:p>
             <a:pPr marL="342900" indent="-342900">
               <a:buFont typeface="Arial" panose="020B0604020202020204" pitchFamily="34" charset="0"/>
               <a:buChar char="•"/>
             </a:pPr>
             <a:endParaRPr lang="en-AU" sz="2000" dirty="0"/>
           </a:p>
-        </p:txBody>
-      </p:sp>
-      <p:sp>
-        <p:nvSpPr>
-          <p:cNvPr id="5" name="TextBox 4">
-            <a:extLst>
-              <a:ext uri="{FF2B5EF4-FFF2-40B4-BE49-F238E27FC236}">
-                <a16:creationId xmlns:a16="http://schemas.microsoft.com/office/drawing/2014/main" id="{8576E7C7-9BBF-43F4-8F7C-AB23466C052B}"/>
-              </a:ext>
-            </a:extLst>
-          </p:cNvPr>
-          <p:cNvSpPr txBox="1"/>
-          <p:nvPr/>
-        </p:nvSpPr>
-        <p:spPr>
-          <a:xfrm>
-            <a:off x="7765142" y="3730173"/>
-            <a:ext cx="3222171" cy="2308324"/>
-          </a:xfrm>
-          <a:prstGeom prst="rect">
-            <a:avLst/>
-          </a:prstGeom>
-          <a:noFill/>
-        </p:spPr>
-        <p:txBody>
-          <a:bodyPr wrap="square" rtlCol="0">
-            <a:spAutoFit/>
-          </a:bodyPr>
-          <a:lstStyle/>
-          <a:p>
-            <a:r>
-              <a:rPr lang="en-AU" dirty="0"/>
-              <a:t>Things to note:</a:t>
-            </a:r>
-          </a:p>
-          <a:p>
-            <a:pPr marL="285750" indent="-285750">
+          <a:p>
+            <a:pPr marL="342900" indent="-342900">
               <a:buFont typeface="Arial" panose="020B0604020202020204" pitchFamily="34" charset="0"/>
               <a:buChar char="•"/>
             </a:pPr>
-            <a:r>
-              <a:rPr lang="en-AU" dirty="0"/>
-              <a:t>Red nodes act as bridge between two networks. These are people who contributed to more than one repo.</a:t>
-            </a:r>
-          </a:p>
-          <a:p>
-            <a:pPr marL="285750" indent="-285750">
+            <a:endParaRPr lang="en-AU" sz="2000" dirty="0"/>
+          </a:p>
+          <a:p>
+            <a:pPr marL="342900" indent="-342900">
               <a:buFont typeface="Arial" panose="020B0604020202020204" pitchFamily="34" charset="0"/>
               <a:buChar char="•"/>
             </a:pPr>
-            <a:r>
-              <a:rPr lang="en-AU" dirty="0"/>
-              <a:t>Nodes with thick edges have higher contribution rate.</a:t>
-            </a:r>
+            <a:endParaRPr lang="en-AU" sz="2000" dirty="0"/>
           </a:p>
         </p:txBody>
       </p:sp>
@@ -5891,45 +5953,232 @@
           <a:chExt cx="0" cy="0"/>
         </a:xfrm>
       </p:grpSpPr>
-      <p:sp>
-        <p:nvSpPr>
-          <p:cNvPr id="2" name="TextBox 1">
-            <a:extLst>
-              <a:ext uri="{FF2B5EF4-FFF2-40B4-BE49-F238E27FC236}">
-                <a16:creationId xmlns:a16="http://schemas.microsoft.com/office/drawing/2014/main" id="{4453F2BD-194B-45B8-8A79-869AC6DA3507}"/>
-              </a:ext>
-            </a:extLst>
-          </p:cNvPr>
-          <p:cNvSpPr txBox="1"/>
+      <p:pic>
+        <p:nvPicPr>
+          <p:cNvPr id="4" name="Picture 3" descr="A picture containing building&#10;&#10;Description automatically generated">
+            <a:extLst>
+              <a:ext uri="{FF2B5EF4-FFF2-40B4-BE49-F238E27FC236}">
+                <a16:creationId xmlns:a16="http://schemas.microsoft.com/office/drawing/2014/main" id="{109B41CE-177C-4DC8-9238-0576CDD47CE8}"/>
+              </a:ext>
+            </a:extLst>
+          </p:cNvPr>
+          <p:cNvPicPr>
+            <a:picLocks noChangeAspect="1"/>
+          </p:cNvPicPr>
           <p:nvPr/>
-        </p:nvSpPr>
+        </p:nvPicPr>
+        <p:blipFill>
+          <a:blip r:embed="rId2">
+            <a:extLst>
+              <a:ext uri="{28A0092B-C50C-407E-A947-70E740481C1C}">
+                <a14:useLocalDpi xmlns:a14="http://schemas.microsoft.com/office/drawing/2010/main" val="0"/>
+              </a:ext>
+            </a:extLst>
+          </a:blip>
+          <a:stretch>
+            <a:fillRect/>
+          </a:stretch>
+        </p:blipFill>
         <p:spPr>
-          <a:xfrm rot="20295732">
-            <a:off x="2425147" y="2782956"/>
-            <a:ext cx="7341705" cy="769441"/>
+          <a:xfrm>
+            <a:off x="7257143" y="1335906"/>
+            <a:ext cx="4267630" cy="4247112"/>
           </a:xfrm>
           <a:prstGeom prst="rect">
             <a:avLst/>
           </a:prstGeom>
-          <a:noFill/>
         </p:spPr>
-        <p:txBody>
-          <a:bodyPr wrap="square" rtlCol="0">
-            <a:spAutoFit/>
-          </a:bodyPr>
-          <a:lstStyle/>
-          <a:p>
-            <a:r>
-              <a:rPr lang="en-AU" sz="4400" dirty="0"/>
-              <a:t>TOPIC &amp; SENTIMENT ANALYSIS</a:t>
-            </a:r>
-          </a:p>
-        </p:txBody>
-      </p:sp>
+      </p:pic>
+      <p:grpSp>
+        <p:nvGrpSpPr>
+          <p:cNvPr id="7" name="Group 6">
+            <a:extLst>
+              <a:ext uri="{FF2B5EF4-FFF2-40B4-BE49-F238E27FC236}">
+                <a16:creationId xmlns:a16="http://schemas.microsoft.com/office/drawing/2014/main" id="{C210859B-9325-4DEA-AE25-B6D0C5F56571}"/>
+              </a:ext>
+            </a:extLst>
+          </p:cNvPr>
+          <p:cNvGrpSpPr/>
+          <p:nvPr/>
+        </p:nvGrpSpPr>
+        <p:grpSpPr>
+          <a:xfrm>
+            <a:off x="7257141" y="45566"/>
+            <a:ext cx="4267631" cy="1290340"/>
+            <a:chOff x="7257141" y="28751"/>
+            <a:chExt cx="4267631" cy="1290340"/>
+          </a:xfrm>
+        </p:grpSpPr>
+        <p:sp>
+          <p:nvSpPr>
+            <p:cNvPr id="5" name="TextBox 4">
+              <a:extLst>
+                <a:ext uri="{FF2B5EF4-FFF2-40B4-BE49-F238E27FC236}">
+                  <a16:creationId xmlns:a16="http://schemas.microsoft.com/office/drawing/2014/main" id="{3BE35669-5538-48E4-AF97-07BA61FA5B87}"/>
+                </a:ext>
+              </a:extLst>
+            </p:cNvPr>
+            <p:cNvSpPr txBox="1"/>
+            <p:nvPr/>
+          </p:nvSpPr>
+          <p:spPr>
+            <a:xfrm>
+              <a:off x="7794494" y="28751"/>
+              <a:ext cx="3192928" cy="461665"/>
+            </a:xfrm>
+            <a:prstGeom prst="rect">
+              <a:avLst/>
+            </a:prstGeom>
+            <a:noFill/>
+          </p:spPr>
+          <p:txBody>
+            <a:bodyPr wrap="square" rtlCol="0">
+              <a:spAutoFit/>
+            </a:bodyPr>
+            <a:lstStyle/>
+            <a:p>
+              <a:r>
+                <a:rPr lang="en-AU" sz="2400" b="1" dirty="0"/>
+                <a:t>Betweenness Centrality</a:t>
+              </a:r>
+            </a:p>
+          </p:txBody>
+        </p:sp>
+        <p:pic>
+          <p:nvPicPr>
+            <p:cNvPr id="6" name="Picture 5">
+              <a:extLst>
+                <a:ext uri="{FF2B5EF4-FFF2-40B4-BE49-F238E27FC236}">
+                  <a16:creationId xmlns:a16="http://schemas.microsoft.com/office/drawing/2014/main" id="{02AB3393-5110-46E8-8741-2D32C72C62B8}"/>
+                </a:ext>
+              </a:extLst>
+            </p:cNvPr>
+            <p:cNvPicPr>
+              <a:picLocks noChangeAspect="1"/>
+            </p:cNvPicPr>
+            <p:nvPr/>
+          </p:nvPicPr>
+          <p:blipFill>
+            <a:blip r:embed="rId3"/>
+            <a:stretch>
+              <a:fillRect/>
+            </a:stretch>
+          </p:blipFill>
+          <p:spPr>
+            <a:xfrm>
+              <a:off x="7257141" y="551976"/>
+              <a:ext cx="4267631" cy="767115"/>
+            </a:xfrm>
+            <a:prstGeom prst="rect">
+              <a:avLst/>
+            </a:prstGeom>
+          </p:spPr>
+        </p:pic>
+      </p:grpSp>
+      <p:grpSp>
+        <p:nvGrpSpPr>
+          <p:cNvPr id="9" name="Group 8">
+            <a:extLst>
+              <a:ext uri="{FF2B5EF4-FFF2-40B4-BE49-F238E27FC236}">
+                <a16:creationId xmlns:a16="http://schemas.microsoft.com/office/drawing/2014/main" id="{119D8646-54F4-4168-BBE6-179FE4FE708F}"/>
+              </a:ext>
+            </a:extLst>
+          </p:cNvPr>
+          <p:cNvGrpSpPr/>
+          <p:nvPr/>
+        </p:nvGrpSpPr>
+        <p:grpSpPr>
+          <a:xfrm>
+            <a:off x="667227" y="507231"/>
+            <a:ext cx="5711687" cy="5075787"/>
+            <a:chOff x="667227" y="507231"/>
+            <a:chExt cx="5711687" cy="5075787"/>
+          </a:xfrm>
+        </p:grpSpPr>
+        <p:pic>
+          <p:nvPicPr>
+            <p:cNvPr id="2" name="Picture 1" descr="A close up of a logo&#10;&#10;Description automatically generated">
+              <a:extLst>
+                <a:ext uri="{FF2B5EF4-FFF2-40B4-BE49-F238E27FC236}">
+                  <a16:creationId xmlns:a16="http://schemas.microsoft.com/office/drawing/2014/main" id="{7011AACE-8267-45EA-A786-11C4CA3B7C0A}"/>
+                </a:ext>
+              </a:extLst>
+            </p:cNvPr>
+            <p:cNvPicPr>
+              <a:picLocks noChangeAspect="1"/>
+            </p:cNvPicPr>
+            <p:nvPr/>
+          </p:nvPicPr>
+          <p:blipFill>
+            <a:blip r:embed="rId4">
+              <a:extLst>
+                <a:ext uri="{28A0092B-C50C-407E-A947-70E740481C1C}">
+                  <a14:useLocalDpi xmlns:a14="http://schemas.microsoft.com/office/drawing/2010/main" val="0"/>
+                </a:ext>
+              </a:extLst>
+            </a:blip>
+            <a:stretch>
+              <a:fillRect/>
+            </a:stretch>
+          </p:blipFill>
+          <p:spPr>
+            <a:xfrm>
+              <a:off x="667227" y="1178672"/>
+              <a:ext cx="5711687" cy="4404346"/>
+            </a:xfrm>
+            <a:prstGeom prst="rect">
+              <a:avLst/>
+            </a:prstGeom>
+          </p:spPr>
+        </p:pic>
+        <p:sp>
+          <p:nvSpPr>
+            <p:cNvPr id="8" name="TextBox 7">
+              <a:extLst>
+                <a:ext uri="{FF2B5EF4-FFF2-40B4-BE49-F238E27FC236}">
+                  <a16:creationId xmlns:a16="http://schemas.microsoft.com/office/drawing/2014/main" id="{C904C74A-F8DC-42B3-B9C4-6CA5125C2487}"/>
+                </a:ext>
+              </a:extLst>
+            </p:cNvPr>
+            <p:cNvSpPr txBox="1"/>
+            <p:nvPr/>
+          </p:nvSpPr>
+          <p:spPr>
+            <a:xfrm>
+              <a:off x="1908313" y="507231"/>
+              <a:ext cx="3657602" cy="707886"/>
+            </a:xfrm>
+            <a:prstGeom prst="rect">
+              <a:avLst/>
+            </a:prstGeom>
+            <a:noFill/>
+          </p:spPr>
+          <p:txBody>
+            <a:bodyPr wrap="square" rtlCol="0">
+              <a:spAutoFit/>
+            </a:bodyPr>
+            <a:lstStyle/>
+            <a:p>
+              <a:r>
+                <a:rPr lang="en-AU" sz="2000" dirty="0"/>
+                <a:t>Histogram of different Centrality Measures for </a:t>
+              </a:r>
+              <a:r>
+                <a:rPr lang="en-AU" sz="2000" dirty="0" err="1"/>
+                <a:t>Github</a:t>
+              </a:r>
+              <a:r>
+                <a:rPr lang="en-AU" sz="2000" dirty="0"/>
+                <a:t> Network</a:t>
+              </a:r>
+            </a:p>
+          </p:txBody>
+        </p:sp>
+      </p:grpSp>
     </p:spTree>
     <p:extLst>
       <p:ext uri="{BB962C8B-B14F-4D97-AF65-F5344CB8AC3E}">
-        <p14:creationId xmlns:p14="http://schemas.microsoft.com/office/powerpoint/2010/main" val="3063396682"/>
+        <p14:creationId xmlns:p14="http://schemas.microsoft.com/office/powerpoint/2010/main" val="3471596278"/>
       </p:ext>
     </p:extLst>
   </p:cSld>
@@ -5956,45 +6205,254 @@
           <a:chExt cx="0" cy="0"/>
         </a:xfrm>
       </p:grpSpPr>
-      <p:sp>
-        <p:nvSpPr>
-          <p:cNvPr id="2" name="TextBox 1">
-            <a:extLst>
-              <a:ext uri="{FF2B5EF4-FFF2-40B4-BE49-F238E27FC236}">
-                <a16:creationId xmlns:a16="http://schemas.microsoft.com/office/drawing/2014/main" id="{79ADCC58-072A-402D-9A8A-CC09B488A30D}"/>
-              </a:ext>
-            </a:extLst>
-          </p:cNvPr>
-          <p:cNvSpPr txBox="1"/>
+      <p:pic>
+        <p:nvPicPr>
+          <p:cNvPr id="7" name="Picture 6" descr="A close up of a logo&#10;&#10;Description automatically generated">
+            <a:extLst>
+              <a:ext uri="{FF2B5EF4-FFF2-40B4-BE49-F238E27FC236}">
+                <a16:creationId xmlns:a16="http://schemas.microsoft.com/office/drawing/2014/main" id="{AB8C3A9C-2596-49AC-9CDE-B83B010F079F}"/>
+              </a:ext>
+            </a:extLst>
+          </p:cNvPr>
+          <p:cNvPicPr>
+            <a:picLocks noChangeAspect="1"/>
+          </p:cNvPicPr>
           <p:nvPr/>
-        </p:nvSpPr>
+        </p:nvPicPr>
+        <p:blipFill>
+          <a:blip r:embed="rId2">
+            <a:extLst>
+              <a:ext uri="{28A0092B-C50C-407E-A947-70E740481C1C}">
+                <a14:useLocalDpi xmlns:a14="http://schemas.microsoft.com/office/drawing/2010/main" val="0"/>
+              </a:ext>
+            </a:extLst>
+          </a:blip>
+          <a:stretch>
+            <a:fillRect/>
+          </a:stretch>
+        </p:blipFill>
         <p:spPr>
-          <a:xfrm rot="20295732">
-            <a:off x="4125249" y="3044279"/>
-            <a:ext cx="3941502" cy="769441"/>
+          <a:xfrm>
+            <a:off x="1369496" y="1565756"/>
+            <a:ext cx="4010585" cy="3991532"/>
           </a:xfrm>
           <a:prstGeom prst="rect">
             <a:avLst/>
           </a:prstGeom>
-          <a:noFill/>
         </p:spPr>
-        <p:txBody>
-          <a:bodyPr wrap="square" rtlCol="0">
-            <a:spAutoFit/>
-          </a:bodyPr>
-          <a:lstStyle/>
-          <a:p>
-            <a:r>
-              <a:rPr lang="en-AU" sz="4400" dirty="0"/>
-              <a:t>ANYTHING ELSE</a:t>
-            </a:r>
-          </a:p>
-        </p:txBody>
-      </p:sp>
+      </p:pic>
+      <p:pic>
+        <p:nvPicPr>
+          <p:cNvPr id="9" name="Picture 8" descr="A close up of a logo&#10;&#10;Description automatically generated">
+            <a:extLst>
+              <a:ext uri="{FF2B5EF4-FFF2-40B4-BE49-F238E27FC236}">
+                <a16:creationId xmlns:a16="http://schemas.microsoft.com/office/drawing/2014/main" id="{61017712-A251-47AE-9BCB-AFE9051999B1}"/>
+              </a:ext>
+            </a:extLst>
+          </p:cNvPr>
+          <p:cNvPicPr>
+            <a:picLocks noChangeAspect="1"/>
+          </p:cNvPicPr>
+          <p:nvPr/>
+        </p:nvPicPr>
+        <p:blipFill>
+          <a:blip r:embed="rId3">
+            <a:extLst>
+              <a:ext uri="{28A0092B-C50C-407E-A947-70E740481C1C}">
+                <a14:useLocalDpi xmlns:a14="http://schemas.microsoft.com/office/drawing/2010/main" val="0"/>
+              </a:ext>
+            </a:extLst>
+          </a:blip>
+          <a:stretch>
+            <a:fillRect/>
+          </a:stretch>
+        </p:blipFill>
+        <p:spPr>
+          <a:xfrm>
+            <a:off x="6970946" y="1433234"/>
+            <a:ext cx="3962953" cy="3953427"/>
+          </a:xfrm>
+          <a:prstGeom prst="rect">
+            <a:avLst/>
+          </a:prstGeom>
+        </p:spPr>
+      </p:pic>
+      <p:grpSp>
+        <p:nvGrpSpPr>
+          <p:cNvPr id="13" name="Group 12">
+            <a:extLst>
+              <a:ext uri="{FF2B5EF4-FFF2-40B4-BE49-F238E27FC236}">
+                <a16:creationId xmlns:a16="http://schemas.microsoft.com/office/drawing/2014/main" id="{951914A7-7931-42D6-B8E9-D2E648CF1FED}"/>
+              </a:ext>
+            </a:extLst>
+          </p:cNvPr>
+          <p:cNvGrpSpPr/>
+          <p:nvPr/>
+        </p:nvGrpSpPr>
+        <p:grpSpPr>
+          <a:xfrm>
+            <a:off x="2066438" y="342919"/>
+            <a:ext cx="2400300" cy="1090315"/>
+            <a:chOff x="2066438" y="195787"/>
+            <a:chExt cx="2400300" cy="1090315"/>
+          </a:xfrm>
+        </p:grpSpPr>
+        <p:sp>
+          <p:nvSpPr>
+            <p:cNvPr id="11" name="TextBox 10">
+              <a:extLst>
+                <a:ext uri="{FF2B5EF4-FFF2-40B4-BE49-F238E27FC236}">
+                  <a16:creationId xmlns:a16="http://schemas.microsoft.com/office/drawing/2014/main" id="{1F671804-8940-4F51-A26F-CDCB40D3ED47}"/>
+                </a:ext>
+              </a:extLst>
+            </p:cNvPr>
+            <p:cNvSpPr txBox="1"/>
+            <p:nvPr/>
+          </p:nvSpPr>
+          <p:spPr>
+            <a:xfrm>
+              <a:off x="2066438" y="195787"/>
+              <a:ext cx="2393910" cy="461665"/>
+            </a:xfrm>
+            <a:prstGeom prst="rect">
+              <a:avLst/>
+            </a:prstGeom>
+            <a:noFill/>
+          </p:spPr>
+          <p:txBody>
+            <a:bodyPr wrap="square" rtlCol="0">
+              <a:spAutoFit/>
+            </a:bodyPr>
+            <a:lstStyle/>
+            <a:p>
+              <a:r>
+                <a:rPr lang="en-AU" sz="2400" b="1" dirty="0"/>
+                <a:t>Degree Centrality</a:t>
+              </a:r>
+            </a:p>
+          </p:txBody>
+        </p:sp>
+        <p:pic>
+          <p:nvPicPr>
+            <p:cNvPr id="12" name="Picture 11">
+              <a:extLst>
+                <a:ext uri="{FF2B5EF4-FFF2-40B4-BE49-F238E27FC236}">
+                  <a16:creationId xmlns:a16="http://schemas.microsoft.com/office/drawing/2014/main" id="{937AC1A2-0C43-469E-8326-6E8EAEB0BA04}"/>
+                </a:ext>
+              </a:extLst>
+            </p:cNvPr>
+            <p:cNvPicPr>
+              <a:picLocks noChangeAspect="1"/>
+            </p:cNvPicPr>
+            <p:nvPr/>
+          </p:nvPicPr>
+          <p:blipFill>
+            <a:blip r:embed="rId4"/>
+            <a:stretch>
+              <a:fillRect/>
+            </a:stretch>
+          </p:blipFill>
+          <p:spPr>
+            <a:xfrm>
+              <a:off x="2066438" y="657452"/>
+              <a:ext cx="2400300" cy="628650"/>
+            </a:xfrm>
+            <a:prstGeom prst="rect">
+              <a:avLst/>
+            </a:prstGeom>
+          </p:spPr>
+        </p:pic>
+      </p:grpSp>
+      <p:grpSp>
+        <p:nvGrpSpPr>
+          <p:cNvPr id="15" name="Group 14">
+            <a:extLst>
+              <a:ext uri="{FF2B5EF4-FFF2-40B4-BE49-F238E27FC236}">
+                <a16:creationId xmlns:a16="http://schemas.microsoft.com/office/drawing/2014/main" id="{33F2A1EA-F36F-42C1-9B85-4E2CF74B671A}"/>
+              </a:ext>
+            </a:extLst>
+          </p:cNvPr>
+          <p:cNvGrpSpPr/>
+          <p:nvPr/>
+        </p:nvGrpSpPr>
+        <p:grpSpPr>
+          <a:xfrm>
+            <a:off x="7680834" y="342918"/>
+            <a:ext cx="2543175" cy="890290"/>
+            <a:chOff x="7680834" y="342918"/>
+            <a:chExt cx="2543175" cy="890290"/>
+          </a:xfrm>
+        </p:grpSpPr>
+        <p:sp>
+          <p:nvSpPr>
+            <p:cNvPr id="10" name="TextBox 9">
+              <a:extLst>
+                <a:ext uri="{FF2B5EF4-FFF2-40B4-BE49-F238E27FC236}">
+                  <a16:creationId xmlns:a16="http://schemas.microsoft.com/office/drawing/2014/main" id="{4AF2DF03-BB84-4700-9470-831ECBADC9DD}"/>
+                </a:ext>
+              </a:extLst>
+            </p:cNvPr>
+            <p:cNvSpPr txBox="1"/>
+            <p:nvPr/>
+          </p:nvSpPr>
+          <p:spPr>
+            <a:xfrm>
+              <a:off x="7880889" y="342918"/>
+              <a:ext cx="2143066" cy="461665"/>
+            </a:xfrm>
+            <a:prstGeom prst="rect">
+              <a:avLst/>
+            </a:prstGeom>
+            <a:noFill/>
+          </p:spPr>
+          <p:txBody>
+            <a:bodyPr wrap="square" rtlCol="0">
+              <a:spAutoFit/>
+            </a:bodyPr>
+            <a:lstStyle/>
+            <a:p>
+              <a:r>
+                <a:rPr lang="en-AU" sz="2400" b="1" dirty="0"/>
+                <a:t>Katz Centrality</a:t>
+              </a:r>
+            </a:p>
+          </p:txBody>
+        </p:sp>
+        <p:pic>
+          <p:nvPicPr>
+            <p:cNvPr id="14" name="Picture 13">
+              <a:extLst>
+                <a:ext uri="{FF2B5EF4-FFF2-40B4-BE49-F238E27FC236}">
+                  <a16:creationId xmlns:a16="http://schemas.microsoft.com/office/drawing/2014/main" id="{7B7415FA-979B-4666-A22F-90CE8241A858}"/>
+                </a:ext>
+              </a:extLst>
+            </p:cNvPr>
+            <p:cNvPicPr>
+              <a:picLocks noChangeAspect="1"/>
+            </p:cNvPicPr>
+            <p:nvPr/>
+          </p:nvPicPr>
+          <p:blipFill>
+            <a:blip r:embed="rId5"/>
+            <a:stretch>
+              <a:fillRect/>
+            </a:stretch>
+          </p:blipFill>
+          <p:spPr>
+            <a:xfrm>
+              <a:off x="7680834" y="804583"/>
+              <a:ext cx="2543175" cy="428625"/>
+            </a:xfrm>
+            <a:prstGeom prst="rect">
+              <a:avLst/>
+            </a:prstGeom>
+          </p:spPr>
+        </p:pic>
+      </p:grpSp>
     </p:spTree>
     <p:extLst>
       <p:ext uri="{BB962C8B-B14F-4D97-AF65-F5344CB8AC3E}">
-        <p14:creationId xmlns:p14="http://schemas.microsoft.com/office/powerpoint/2010/main" val="2630018589"/>
+        <p14:creationId xmlns:p14="http://schemas.microsoft.com/office/powerpoint/2010/main" val="1594502958"/>
       </p:ext>
     </p:extLst>
   </p:cSld>
@@ -6026,7 +6484,7 @@
           <p:cNvPr id="2" name="TextBox 1">
             <a:extLst>
               <a:ext uri="{FF2B5EF4-FFF2-40B4-BE49-F238E27FC236}">
-                <a16:creationId xmlns:a16="http://schemas.microsoft.com/office/drawing/2014/main" id="{7AEE4CEF-26E9-4BCC-9D7B-1088C239C2F1}"/>
+                <a16:creationId xmlns:a16="http://schemas.microsoft.com/office/drawing/2014/main" id="{4453F2BD-194B-45B8-8A79-869AC6DA3507}"/>
               </a:ext>
             </a:extLst>
           </p:cNvPr>
@@ -6035,8 +6493,8 @@
         </p:nvSpPr>
         <p:spPr>
           <a:xfrm rot="20295732">
-            <a:off x="4678258" y="3044279"/>
-            <a:ext cx="2835482" cy="769441"/>
+            <a:off x="2425147" y="2782956"/>
+            <a:ext cx="7341705" cy="769441"/>
           </a:xfrm>
           <a:prstGeom prst="rect">
             <a:avLst/>
@@ -6051,7 +6509,7 @@
           <a:p>
             <a:r>
               <a:rPr lang="en-AU" sz="4400" dirty="0"/>
-              <a:t>SUMMARY</a:t>
+              <a:t>TOPIC &amp; SENTIMENT ANALYSIS</a:t>
             </a:r>
           </a:p>
         </p:txBody>
@@ -6059,7 +6517,72 @@
     </p:spTree>
     <p:extLst>
       <p:ext uri="{BB962C8B-B14F-4D97-AF65-F5344CB8AC3E}">
-        <p14:creationId xmlns:p14="http://schemas.microsoft.com/office/powerpoint/2010/main" val="3777577520"/>
+        <p14:creationId xmlns:p14="http://schemas.microsoft.com/office/powerpoint/2010/main" val="3063396682"/>
+      </p:ext>
+    </p:extLst>
+  </p:cSld>
+  <p:clrMapOvr>
+    <a:masterClrMapping/>
+  </p:clrMapOvr>
+</p:sld>
+</file>
+
+<file path=ppt/slides/slide9.xml><?xml version="1.0" encoding="utf-8"?>
+<p:sld xmlns:a="http://schemas.openxmlformats.org/drawingml/2006/main" xmlns:r="http://schemas.openxmlformats.org/officeDocument/2006/relationships" xmlns:p="http://schemas.openxmlformats.org/presentationml/2006/main">
+  <p:cSld>
+    <p:spTree>
+      <p:nvGrpSpPr>
+        <p:cNvPr id="1" name=""/>
+        <p:cNvGrpSpPr/>
+        <p:nvPr/>
+      </p:nvGrpSpPr>
+      <p:grpSpPr>
+        <a:xfrm>
+          <a:off x="0" y="0"/>
+          <a:ext cx="0" cy="0"/>
+          <a:chOff x="0" y="0"/>
+          <a:chExt cx="0" cy="0"/>
+        </a:xfrm>
+      </p:grpSpPr>
+      <p:sp>
+        <p:nvSpPr>
+          <p:cNvPr id="2" name="TextBox 1">
+            <a:extLst>
+              <a:ext uri="{FF2B5EF4-FFF2-40B4-BE49-F238E27FC236}">
+                <a16:creationId xmlns:a16="http://schemas.microsoft.com/office/drawing/2014/main" id="{79ADCC58-072A-402D-9A8A-CC09B488A30D}"/>
+              </a:ext>
+            </a:extLst>
+          </p:cNvPr>
+          <p:cNvSpPr txBox="1"/>
+          <p:nvPr/>
+        </p:nvSpPr>
+        <p:spPr>
+          <a:xfrm rot="20295732">
+            <a:off x="4125249" y="3044279"/>
+            <a:ext cx="3941502" cy="769441"/>
+          </a:xfrm>
+          <a:prstGeom prst="rect">
+            <a:avLst/>
+          </a:prstGeom>
+          <a:noFill/>
+        </p:spPr>
+        <p:txBody>
+          <a:bodyPr wrap="square" rtlCol="0">
+            <a:spAutoFit/>
+          </a:bodyPr>
+          <a:lstStyle/>
+          <a:p>
+            <a:r>
+              <a:rPr lang="en-AU" sz="4400" dirty="0"/>
+              <a:t>ANYTHING ELSE</a:t>
+            </a:r>
+          </a:p>
+        </p:txBody>
+      </p:sp>
+    </p:spTree>
+    <p:extLst>
+      <p:ext uri="{BB962C8B-B14F-4D97-AF65-F5344CB8AC3E}">
+        <p14:creationId xmlns:p14="http://schemas.microsoft.com/office/powerpoint/2010/main" val="2630018589"/>
       </p:ext>
     </p:extLst>
   </p:cSld>

</xml_diff>